<commit_message>
First version transposonmapping_satay.py finished
</commit_message>
<xml_diff>
--- a/docs/media/Folder_Structure_VM.pptx
+++ b/docs/media/Folder_Structure_VM.pptx
@@ -243,7 +243,7 @@
           <a:p>
             <a:fld id="{7279B8E1-3A40-470C-B8F9-BC400248F4FC}" type="datetimeFigureOut">
               <a:rPr lang="en-GB" smtClean="0"/>
-              <a:t>22/06/2020</a:t>
+              <a:t>27/07/2020</a:t>
             </a:fld>
             <a:endParaRPr lang="en-GB"/>
           </a:p>
@@ -413,7 +413,7 @@
           <a:p>
             <a:fld id="{7279B8E1-3A40-470C-B8F9-BC400248F4FC}" type="datetimeFigureOut">
               <a:rPr lang="en-GB" smtClean="0"/>
-              <a:t>22/06/2020</a:t>
+              <a:t>27/07/2020</a:t>
             </a:fld>
             <a:endParaRPr lang="en-GB"/>
           </a:p>
@@ -593,7 +593,7 @@
           <a:p>
             <a:fld id="{7279B8E1-3A40-470C-B8F9-BC400248F4FC}" type="datetimeFigureOut">
               <a:rPr lang="en-GB" smtClean="0"/>
-              <a:t>22/06/2020</a:t>
+              <a:t>27/07/2020</a:t>
             </a:fld>
             <a:endParaRPr lang="en-GB"/>
           </a:p>
@@ -763,7 +763,7 @@
           <a:p>
             <a:fld id="{7279B8E1-3A40-470C-B8F9-BC400248F4FC}" type="datetimeFigureOut">
               <a:rPr lang="en-GB" smtClean="0"/>
-              <a:t>22/06/2020</a:t>
+              <a:t>27/07/2020</a:t>
             </a:fld>
             <a:endParaRPr lang="en-GB"/>
           </a:p>
@@ -1009,7 +1009,7 @@
           <a:p>
             <a:fld id="{7279B8E1-3A40-470C-B8F9-BC400248F4FC}" type="datetimeFigureOut">
               <a:rPr lang="en-GB" smtClean="0"/>
-              <a:t>22/06/2020</a:t>
+              <a:t>27/07/2020</a:t>
             </a:fld>
             <a:endParaRPr lang="en-GB"/>
           </a:p>
@@ -1241,7 +1241,7 @@
           <a:p>
             <a:fld id="{7279B8E1-3A40-470C-B8F9-BC400248F4FC}" type="datetimeFigureOut">
               <a:rPr lang="en-GB" smtClean="0"/>
-              <a:t>22/06/2020</a:t>
+              <a:t>27/07/2020</a:t>
             </a:fld>
             <a:endParaRPr lang="en-GB"/>
           </a:p>
@@ -1608,7 +1608,7 @@
           <a:p>
             <a:fld id="{7279B8E1-3A40-470C-B8F9-BC400248F4FC}" type="datetimeFigureOut">
               <a:rPr lang="en-GB" smtClean="0"/>
-              <a:t>22/06/2020</a:t>
+              <a:t>27/07/2020</a:t>
             </a:fld>
             <a:endParaRPr lang="en-GB"/>
           </a:p>
@@ -1726,7 +1726,7 @@
           <a:p>
             <a:fld id="{7279B8E1-3A40-470C-B8F9-BC400248F4FC}" type="datetimeFigureOut">
               <a:rPr lang="en-GB" smtClean="0"/>
-              <a:t>22/06/2020</a:t>
+              <a:t>27/07/2020</a:t>
             </a:fld>
             <a:endParaRPr lang="en-GB"/>
           </a:p>
@@ -1821,7 +1821,7 @@
           <a:p>
             <a:fld id="{7279B8E1-3A40-470C-B8F9-BC400248F4FC}" type="datetimeFigureOut">
               <a:rPr lang="en-GB" smtClean="0"/>
-              <a:t>22/06/2020</a:t>
+              <a:t>27/07/2020</a:t>
             </a:fld>
             <a:endParaRPr lang="en-GB"/>
           </a:p>
@@ -2098,7 +2098,7 @@
           <a:p>
             <a:fld id="{7279B8E1-3A40-470C-B8F9-BC400248F4FC}" type="datetimeFigureOut">
               <a:rPr lang="en-GB" smtClean="0"/>
-              <a:t>22/06/2020</a:t>
+              <a:t>27/07/2020</a:t>
             </a:fld>
             <a:endParaRPr lang="en-GB"/>
           </a:p>
@@ -2351,7 +2351,7 @@
           <a:p>
             <a:fld id="{7279B8E1-3A40-470C-B8F9-BC400248F4FC}" type="datetimeFigureOut">
               <a:rPr lang="en-GB" smtClean="0"/>
-              <a:t>22/06/2020</a:t>
+              <a:t>27/07/2020</a:t>
             </a:fld>
             <a:endParaRPr lang="en-GB"/>
           </a:p>
@@ -2564,7 +2564,7 @@
           <a:p>
             <a:fld id="{7279B8E1-3A40-470C-B8F9-BC400248F4FC}" type="datetimeFigureOut">
               <a:rPr lang="en-GB" smtClean="0"/>
-              <a:t>22/06/2020</a:t>
+              <a:t>27/07/2020</a:t>
             </a:fld>
             <a:endParaRPr lang="en-GB"/>
           </a:p>
@@ -2971,16 +2971,16 @@
       </p:grpSpPr>
       <p:grpSp>
         <p:nvGrpSpPr>
-          <p:cNvPr id="78" name="Group 77"/>
+          <p:cNvPr id="49" name="Group 48"/>
           <p:cNvGrpSpPr/>
           <p:nvPr/>
         </p:nvGrpSpPr>
         <p:grpSpPr>
           <a:xfrm>
             <a:off x="31167" y="217058"/>
-            <a:ext cx="19129646" cy="10799680"/>
+            <a:ext cx="19129646" cy="11078813"/>
             <a:chOff x="31167" y="217058"/>
-            <a:chExt cx="19129646" cy="10799680"/>
+            <a:chExt cx="19129646" cy="11078813"/>
           </a:xfrm>
         </p:grpSpPr>
         <p:sp>
@@ -2991,7 +2991,7 @@
           </p:nvSpPr>
           <p:spPr>
             <a:xfrm>
-              <a:off x="31167" y="6440954"/>
+              <a:off x="31167" y="6699572"/>
               <a:ext cx="2373745" cy="258618"/>
             </a:xfrm>
             <a:prstGeom prst="roundRect">
@@ -3112,7 +3112,7 @@
           </p:nvSpPr>
           <p:spPr>
             <a:xfrm>
-              <a:off x="31167" y="10638758"/>
+              <a:off x="31167" y="10917891"/>
               <a:ext cx="2373745" cy="258618"/>
             </a:xfrm>
             <a:prstGeom prst="roundRect">
@@ -3175,7 +3175,7 @@
           </p:nvSpPr>
           <p:spPr>
             <a:xfrm>
-              <a:off x="2863268" y="10519396"/>
+              <a:off x="2863268" y="10798529"/>
               <a:ext cx="2373745" cy="497342"/>
             </a:xfrm>
             <a:prstGeom prst="roundRect">
@@ -3301,7 +3301,7 @@
           </p:nvSpPr>
           <p:spPr>
             <a:xfrm>
-              <a:off x="5648031" y="6440954"/>
+              <a:off x="5648031" y="6699572"/>
               <a:ext cx="2373745" cy="258618"/>
             </a:xfrm>
             <a:prstGeom prst="roundRect">
@@ -5097,7 +5097,7 @@
           <p:spPr>
             <a:xfrm flipV="1">
               <a:off x="8021776" y="4759937"/>
-              <a:ext cx="411018" cy="1810326"/>
+              <a:ext cx="411018" cy="2068944"/>
             </a:xfrm>
             <a:prstGeom prst="bentConnector3">
               <a:avLst/>
@@ -5136,7 +5136,7 @@
           <p:spPr>
             <a:xfrm flipV="1">
               <a:off x="8021776" y="5277173"/>
-              <a:ext cx="411017" cy="1293090"/>
+              <a:ext cx="411017" cy="1551708"/>
             </a:xfrm>
             <a:prstGeom prst="bentConnector3">
               <a:avLst/>
@@ -5175,7 +5175,7 @@
           <p:spPr>
             <a:xfrm flipV="1">
               <a:off x="8021776" y="5794409"/>
-              <a:ext cx="411017" cy="775854"/>
+              <a:ext cx="411017" cy="1034472"/>
             </a:xfrm>
             <a:prstGeom prst="bentConnector3">
               <a:avLst/>
@@ -5214,46 +5214,7 @@
           <p:spPr>
             <a:xfrm flipV="1">
               <a:off x="8021776" y="6311645"/>
-              <a:ext cx="411016" cy="258618"/>
-            </a:xfrm>
-            <a:prstGeom prst="bentConnector3">
-              <a:avLst/>
-            </a:prstGeom>
-            <a:ln>
-              <a:solidFill>
-                <a:schemeClr val="accent2"/>
-              </a:solidFill>
-              <a:tailEnd type="triangle"/>
-            </a:ln>
-          </p:spPr>
-          <p:style>
-            <a:lnRef idx="1">
-              <a:schemeClr val="accent1"/>
-            </a:lnRef>
-            <a:fillRef idx="0">
-              <a:schemeClr val="accent1"/>
-            </a:fillRef>
-            <a:effectRef idx="0">
-              <a:schemeClr val="accent1"/>
-            </a:effectRef>
-            <a:fontRef idx="minor">
-              <a:schemeClr val="tx1"/>
-            </a:fontRef>
-          </p:style>
-        </p:cxnSp>
-        <p:cxnSp>
-          <p:nvCxnSpPr>
-            <p:cNvPr id="75" name="Elbow Connector 74"/>
-            <p:cNvCxnSpPr>
-              <a:stCxn id="10" idx="3"/>
-              <a:endCxn id="23" idx="1"/>
-            </p:cNvCxnSpPr>
-            <p:nvPr/>
-          </p:nvCxnSpPr>
-          <p:spPr>
-            <a:xfrm>
-              <a:off x="8021776" y="6570263"/>
-              <a:ext cx="411015" cy="263239"/>
+              <a:ext cx="411016" cy="517236"/>
             </a:xfrm>
             <a:prstGeom prst="bentConnector3">
               <a:avLst/>
@@ -5291,8 +5252,8 @@
           </p:nvCxnSpPr>
           <p:spPr>
             <a:xfrm>
-              <a:off x="8021776" y="6570263"/>
-              <a:ext cx="411015" cy="785096"/>
+              <a:off x="8021776" y="6828881"/>
+              <a:ext cx="411015" cy="526478"/>
             </a:xfrm>
             <a:prstGeom prst="bentConnector3">
               <a:avLst/>
@@ -5330,8 +5291,8 @@
           </p:nvCxnSpPr>
           <p:spPr>
             <a:xfrm>
-              <a:off x="8021776" y="6570263"/>
-              <a:ext cx="411014" cy="1305533"/>
+              <a:off x="8021776" y="6828881"/>
+              <a:ext cx="411014" cy="1046915"/>
             </a:xfrm>
             <a:prstGeom prst="bentConnector3">
               <a:avLst/>
@@ -5369,8 +5330,8 @@
           </p:nvCxnSpPr>
           <p:spPr>
             <a:xfrm>
-              <a:off x="8021776" y="6570263"/>
-              <a:ext cx="411013" cy="1822769"/>
+              <a:off x="8021776" y="6828881"/>
+              <a:ext cx="411013" cy="1564151"/>
             </a:xfrm>
             <a:prstGeom prst="bentConnector3">
               <a:avLst/>
@@ -5525,7 +5486,7 @@
           </p:nvCxnSpPr>
           <p:spPr>
             <a:xfrm>
-              <a:off x="2404912" y="10768067"/>
+              <a:off x="2404912" y="11047200"/>
               <a:ext cx="458356" cy="0"/>
             </a:xfrm>
             <a:prstGeom prst="straightConnector1">
@@ -5604,7 +5565,7 @@
           <p:spPr>
             <a:xfrm>
               <a:off x="5237013" y="3587624"/>
-              <a:ext cx="411018" cy="2982639"/>
+              <a:ext cx="411018" cy="3241257"/>
             </a:xfrm>
             <a:prstGeom prst="bentConnector3">
               <a:avLst/>
@@ -5639,7 +5600,7 @@
           </p:nvSpPr>
           <p:spPr>
             <a:xfrm>
-              <a:off x="2863267" y="9594511"/>
+              <a:off x="2863268" y="9811520"/>
               <a:ext cx="2373745" cy="258618"/>
             </a:xfrm>
             <a:prstGeom prst="roundRect">
@@ -5686,11 +5647,6 @@
                 </a:rPr>
                 <a:t>Desktop</a:t>
               </a:r>
-              <a:endParaRPr lang="en-GB" sz="1400" dirty="0" smtClean="0">
-                <a:solidFill>
-                  <a:schemeClr val="tx1"/>
-                </a:solidFill>
-              </a:endParaRPr>
             </a:p>
           </p:txBody>
         </p:sp>
@@ -5702,7 +5658,7 @@
           </p:nvSpPr>
           <p:spPr>
             <a:xfrm>
-              <a:off x="5648031" y="9594511"/>
+              <a:off x="5648032" y="9811520"/>
               <a:ext cx="2373745" cy="258618"/>
             </a:xfrm>
             <a:prstGeom prst="roundRect">
@@ -5768,8 +5724,8 @@
           </p:nvCxnSpPr>
           <p:spPr>
             <a:xfrm>
-              <a:off x="2404912" y="6570263"/>
-              <a:ext cx="458355" cy="3153557"/>
+              <a:off x="2404912" y="6828881"/>
+              <a:ext cx="458356" cy="3111948"/>
             </a:xfrm>
             <a:prstGeom prst="bentConnector3">
               <a:avLst/>
@@ -5807,7 +5763,7 @@
           </p:nvCxnSpPr>
           <p:spPr>
             <a:xfrm>
-              <a:off x="5237012" y="9723820"/>
+              <a:off x="5237013" y="9940829"/>
               <a:ext cx="411019" cy="0"/>
             </a:xfrm>
             <a:prstGeom prst="straightConnector1">
@@ -5847,12 +5803,155 @@
           <p:spPr>
             <a:xfrm flipV="1">
               <a:off x="2404912" y="3587624"/>
-              <a:ext cx="458356" cy="2982639"/>
+              <a:ext cx="458356" cy="3241257"/>
             </a:xfrm>
             <a:prstGeom prst="bentConnector3">
               <a:avLst>
                 <a:gd name="adj1" fmla="val 50000"/>
               </a:avLst>
+            </a:prstGeom>
+            <a:ln>
+              <a:solidFill>
+                <a:schemeClr val="accent2"/>
+              </a:solidFill>
+              <a:tailEnd type="triangle"/>
+            </a:ln>
+          </p:spPr>
+          <p:style>
+            <a:lnRef idx="1">
+              <a:schemeClr val="accent1"/>
+            </a:lnRef>
+            <a:fillRef idx="0">
+              <a:schemeClr val="accent1"/>
+            </a:fillRef>
+            <a:effectRef idx="0">
+              <a:schemeClr val="accent1"/>
+            </a:effectRef>
+            <a:fontRef idx="minor">
+              <a:schemeClr val="tx1"/>
+            </a:fontRef>
+          </p:style>
+        </p:cxnSp>
+        <p:sp>
+          <p:nvSpPr>
+            <p:cNvPr id="63" name="Rounded Rectangle 62"/>
+            <p:cNvSpPr/>
+            <p:nvPr/>
+          </p:nvSpPr>
+          <p:spPr>
+            <a:xfrm>
+              <a:off x="8432789" y="8780959"/>
+              <a:ext cx="2373745" cy="258618"/>
+            </a:xfrm>
+            <a:prstGeom prst="roundRect">
+              <a:avLst/>
+            </a:prstGeom>
+            <a:solidFill>
+              <a:schemeClr val="accent2">
+                <a:lumMod val="20000"/>
+                <a:lumOff val="80000"/>
+              </a:schemeClr>
+            </a:solidFill>
+            <a:ln w="19050">
+              <a:solidFill>
+                <a:schemeClr val="accent2"/>
+              </a:solidFill>
+            </a:ln>
+          </p:spPr>
+          <p:style>
+            <a:lnRef idx="2">
+              <a:schemeClr val="accent1">
+                <a:shade val="50000"/>
+              </a:schemeClr>
+            </a:lnRef>
+            <a:fillRef idx="1">
+              <a:schemeClr val="accent1"/>
+            </a:fillRef>
+            <a:effectRef idx="0">
+              <a:schemeClr val="accent1"/>
+            </a:effectRef>
+            <a:fontRef idx="minor">
+              <a:schemeClr val="lt1"/>
+            </a:fontRef>
+          </p:style>
+          <p:txBody>
+            <a:bodyPr rtlCol="0" anchor="ctr"/>
+            <a:lstStyle/>
+            <a:p>
+              <a:pPr algn="ctr"/>
+              <a:r>
+                <a:rPr lang="en-GB" sz="1400" dirty="0" err="1" smtClean="0">
+                  <a:solidFill>
+                    <a:schemeClr val="tx1"/>
+                  </a:solidFill>
+                </a:rPr>
+                <a:t>python_codes</a:t>
+              </a:r>
+              <a:endParaRPr lang="en-GB" sz="1400" dirty="0" smtClean="0">
+                <a:solidFill>
+                  <a:schemeClr val="tx1"/>
+                </a:solidFill>
+              </a:endParaRPr>
+            </a:p>
+          </p:txBody>
+        </p:sp>
+        <p:cxnSp>
+          <p:nvCxnSpPr>
+            <p:cNvPr id="66" name="Elbow Connector 65"/>
+            <p:cNvCxnSpPr>
+              <a:stCxn id="10" idx="3"/>
+              <a:endCxn id="63" idx="1"/>
+            </p:cNvCxnSpPr>
+            <p:nvPr/>
+          </p:nvCxnSpPr>
+          <p:spPr>
+            <a:xfrm>
+              <a:off x="8021776" y="6828881"/>
+              <a:ext cx="411013" cy="2081387"/>
+            </a:xfrm>
+            <a:prstGeom prst="bentConnector3">
+              <a:avLst>
+                <a:gd name="adj1" fmla="val 50000"/>
+              </a:avLst>
+            </a:prstGeom>
+            <a:ln>
+              <a:solidFill>
+                <a:schemeClr val="accent2"/>
+              </a:solidFill>
+              <a:tailEnd type="triangle"/>
+            </a:ln>
+          </p:spPr>
+          <p:style>
+            <a:lnRef idx="1">
+              <a:schemeClr val="accent1"/>
+            </a:lnRef>
+            <a:fillRef idx="0">
+              <a:schemeClr val="accent1"/>
+            </a:fillRef>
+            <a:effectRef idx="0">
+              <a:schemeClr val="accent1"/>
+            </a:effectRef>
+            <a:fontRef idx="minor">
+              <a:schemeClr val="tx1"/>
+            </a:fontRef>
+          </p:style>
+        </p:cxnSp>
+        <p:cxnSp>
+          <p:nvCxnSpPr>
+            <p:cNvPr id="74" name="Straight Arrow Connector 73"/>
+            <p:cNvCxnSpPr>
+              <a:stCxn id="10" idx="3"/>
+              <a:endCxn id="23" idx="1"/>
+            </p:cNvCxnSpPr>
+            <p:nvPr/>
+          </p:nvCxnSpPr>
+          <p:spPr>
+            <a:xfrm>
+              <a:off x="8021776" y="6828881"/>
+              <a:ext cx="411015" cy="4621"/>
+            </a:xfrm>
+            <a:prstGeom prst="straightConnector1">
+              <a:avLst/>
             </a:prstGeom>
             <a:ln>
               <a:solidFill>

</xml_diff>

<commit_message>
Update transposonmapping_satay.py regarding reading file for essential genes.
</commit_message>
<xml_diff>
--- a/docs/media/Folder_Structure_VM.pptx
+++ b/docs/media/Folder_Structure_VM.pptx
@@ -243,7 +243,7 @@
           <a:p>
             <a:fld id="{7279B8E1-3A40-470C-B8F9-BC400248F4FC}" type="datetimeFigureOut">
               <a:rPr lang="en-GB" smtClean="0"/>
-              <a:t>27/07/2020</a:t>
+              <a:t>07/08/2020</a:t>
             </a:fld>
             <a:endParaRPr lang="en-GB"/>
           </a:p>
@@ -413,7 +413,7 @@
           <a:p>
             <a:fld id="{7279B8E1-3A40-470C-B8F9-BC400248F4FC}" type="datetimeFigureOut">
               <a:rPr lang="en-GB" smtClean="0"/>
-              <a:t>27/07/2020</a:t>
+              <a:t>07/08/2020</a:t>
             </a:fld>
             <a:endParaRPr lang="en-GB"/>
           </a:p>
@@ -593,7 +593,7 @@
           <a:p>
             <a:fld id="{7279B8E1-3A40-470C-B8F9-BC400248F4FC}" type="datetimeFigureOut">
               <a:rPr lang="en-GB" smtClean="0"/>
-              <a:t>27/07/2020</a:t>
+              <a:t>07/08/2020</a:t>
             </a:fld>
             <a:endParaRPr lang="en-GB"/>
           </a:p>
@@ -763,7 +763,7 @@
           <a:p>
             <a:fld id="{7279B8E1-3A40-470C-B8F9-BC400248F4FC}" type="datetimeFigureOut">
               <a:rPr lang="en-GB" smtClean="0"/>
-              <a:t>27/07/2020</a:t>
+              <a:t>07/08/2020</a:t>
             </a:fld>
             <a:endParaRPr lang="en-GB"/>
           </a:p>
@@ -1009,7 +1009,7 @@
           <a:p>
             <a:fld id="{7279B8E1-3A40-470C-B8F9-BC400248F4FC}" type="datetimeFigureOut">
               <a:rPr lang="en-GB" smtClean="0"/>
-              <a:t>27/07/2020</a:t>
+              <a:t>07/08/2020</a:t>
             </a:fld>
             <a:endParaRPr lang="en-GB"/>
           </a:p>
@@ -1241,7 +1241,7 @@
           <a:p>
             <a:fld id="{7279B8E1-3A40-470C-B8F9-BC400248F4FC}" type="datetimeFigureOut">
               <a:rPr lang="en-GB" smtClean="0"/>
-              <a:t>27/07/2020</a:t>
+              <a:t>07/08/2020</a:t>
             </a:fld>
             <a:endParaRPr lang="en-GB"/>
           </a:p>
@@ -1608,7 +1608,7 @@
           <a:p>
             <a:fld id="{7279B8E1-3A40-470C-B8F9-BC400248F4FC}" type="datetimeFigureOut">
               <a:rPr lang="en-GB" smtClean="0"/>
-              <a:t>27/07/2020</a:t>
+              <a:t>07/08/2020</a:t>
             </a:fld>
             <a:endParaRPr lang="en-GB"/>
           </a:p>
@@ -1726,7 +1726,7 @@
           <a:p>
             <a:fld id="{7279B8E1-3A40-470C-B8F9-BC400248F4FC}" type="datetimeFigureOut">
               <a:rPr lang="en-GB" smtClean="0"/>
-              <a:t>27/07/2020</a:t>
+              <a:t>07/08/2020</a:t>
             </a:fld>
             <a:endParaRPr lang="en-GB"/>
           </a:p>
@@ -1821,7 +1821,7 @@
           <a:p>
             <a:fld id="{7279B8E1-3A40-470C-B8F9-BC400248F4FC}" type="datetimeFigureOut">
               <a:rPr lang="en-GB" smtClean="0"/>
-              <a:t>27/07/2020</a:t>
+              <a:t>07/08/2020</a:t>
             </a:fld>
             <a:endParaRPr lang="en-GB"/>
           </a:p>
@@ -2098,7 +2098,7 @@
           <a:p>
             <a:fld id="{7279B8E1-3A40-470C-B8F9-BC400248F4FC}" type="datetimeFigureOut">
               <a:rPr lang="en-GB" smtClean="0"/>
-              <a:t>27/07/2020</a:t>
+              <a:t>07/08/2020</a:t>
             </a:fld>
             <a:endParaRPr lang="en-GB"/>
           </a:p>
@@ -2351,7 +2351,7 @@
           <a:p>
             <a:fld id="{7279B8E1-3A40-470C-B8F9-BC400248F4FC}" type="datetimeFigureOut">
               <a:rPr lang="en-GB" smtClean="0"/>
-              <a:t>27/07/2020</a:t>
+              <a:t>07/08/2020</a:t>
             </a:fld>
             <a:endParaRPr lang="en-GB"/>
           </a:p>
@@ -2564,7 +2564,7 @@
           <a:p>
             <a:fld id="{7279B8E1-3A40-470C-B8F9-BC400248F4FC}" type="datetimeFigureOut">
               <a:rPr lang="en-GB" smtClean="0"/>
-              <a:t>27/07/2020</a:t>
+              <a:t>07/08/2020</a:t>
             </a:fld>
             <a:endParaRPr lang="en-GB"/>
           </a:p>
@@ -2971,7 +2971,7 @@
       </p:grpSpPr>
       <p:grpSp>
         <p:nvGrpSpPr>
-          <p:cNvPr id="8" name="Group 7"/>
+          <p:cNvPr id="35" name="Group 34"/>
           <p:cNvGrpSpPr/>
           <p:nvPr/>
         </p:nvGrpSpPr>
@@ -2983,6 +2983,45 @@
             <a:chExt cx="19129646" cy="11810748"/>
           </a:xfrm>
         </p:grpSpPr>
+        <p:cxnSp>
+          <p:nvCxnSpPr>
+            <p:cNvPr id="75" name="Straight Arrow Connector 74"/>
+            <p:cNvCxnSpPr>
+              <a:stCxn id="4" idx="3"/>
+              <a:endCxn id="70" idx="1"/>
+            </p:cNvCxnSpPr>
+            <p:nvPr/>
+          </p:nvCxnSpPr>
+          <p:spPr>
+            <a:xfrm flipV="1">
+              <a:off x="2404912" y="6823907"/>
+              <a:ext cx="458355" cy="4974"/>
+            </a:xfrm>
+            <a:prstGeom prst="straightConnector1">
+              <a:avLst/>
+            </a:prstGeom>
+            <a:ln>
+              <a:solidFill>
+                <a:schemeClr val="accent1"/>
+              </a:solidFill>
+              <a:tailEnd type="triangle"/>
+            </a:ln>
+          </p:spPr>
+          <p:style>
+            <a:lnRef idx="1">
+              <a:schemeClr val="accent1"/>
+            </a:lnRef>
+            <a:fillRef idx="0">
+              <a:schemeClr val="accent1"/>
+            </a:fillRef>
+            <a:effectRef idx="0">
+              <a:schemeClr val="accent1"/>
+            </a:effectRef>
+            <a:fontRef idx="minor">
+              <a:schemeClr val="tx1"/>
+            </a:fontRef>
+          </p:style>
+        </p:cxnSp>
         <p:sp>
           <p:nvSpPr>
             <p:cNvPr id="4" name="Rounded Rectangle 3"/>
@@ -6060,6 +6099,267 @@
             <a:ln>
               <a:solidFill>
                 <a:schemeClr val="accent2"/>
+              </a:solidFill>
+              <a:tailEnd type="triangle"/>
+            </a:ln>
+          </p:spPr>
+          <p:style>
+            <a:lnRef idx="1">
+              <a:schemeClr val="accent1"/>
+            </a:lnRef>
+            <a:fillRef idx="0">
+              <a:schemeClr val="accent1"/>
+            </a:fillRef>
+            <a:effectRef idx="0">
+              <a:schemeClr val="accent1"/>
+            </a:effectRef>
+            <a:fontRef idx="minor">
+              <a:schemeClr val="tx1"/>
+            </a:fontRef>
+          </p:style>
+        </p:cxnSp>
+        <p:sp>
+          <p:nvSpPr>
+            <p:cNvPr id="70" name="Rounded Rectangle 69"/>
+            <p:cNvSpPr/>
+            <p:nvPr/>
+          </p:nvSpPr>
+          <p:spPr>
+            <a:xfrm>
+              <a:off x="2863267" y="6694598"/>
+              <a:ext cx="2373745" cy="258618"/>
+            </a:xfrm>
+            <a:prstGeom prst="roundRect">
+              <a:avLst/>
+            </a:prstGeom>
+            <a:solidFill>
+              <a:schemeClr val="accent1">
+                <a:lumMod val="20000"/>
+                <a:lumOff val="80000"/>
+              </a:schemeClr>
+            </a:solidFill>
+            <a:ln w="19050">
+              <a:solidFill>
+                <a:schemeClr val="accent1"/>
+              </a:solidFill>
+            </a:ln>
+          </p:spPr>
+          <p:style>
+            <a:lnRef idx="2">
+              <a:schemeClr val="accent1">
+                <a:shade val="50000"/>
+              </a:schemeClr>
+            </a:lnRef>
+            <a:fillRef idx="1">
+              <a:schemeClr val="accent1"/>
+            </a:fillRef>
+            <a:effectRef idx="0">
+              <a:schemeClr val="accent1"/>
+            </a:effectRef>
+            <a:fontRef idx="minor">
+              <a:schemeClr val="lt1"/>
+            </a:fontRef>
+          </p:style>
+          <p:txBody>
+            <a:bodyPr rtlCol="0" anchor="ctr"/>
+            <a:lstStyle/>
+            <a:p>
+              <a:pPr algn="ctr"/>
+              <a:r>
+                <a:rPr lang="en-GB" sz="1400" b="1" dirty="0">
+                  <a:solidFill>
+                    <a:schemeClr val="tx1"/>
+                  </a:solidFill>
+                </a:rPr>
+                <a:t>p</a:t>
+              </a:r>
+              <a:r>
+                <a:rPr lang="en-GB" sz="1400" b="1" dirty="0" smtClean="0">
+                  <a:solidFill>
+                    <a:schemeClr val="tx1"/>
+                  </a:solidFill>
+                </a:rPr>
+                <a:t>rocessing_workflow.sh</a:t>
+              </a:r>
+              <a:endParaRPr lang="en-GB" sz="1400" b="1" dirty="0">
+                <a:solidFill>
+                  <a:schemeClr val="tx1"/>
+                </a:solidFill>
+              </a:endParaRPr>
+            </a:p>
+          </p:txBody>
+        </p:sp>
+        <p:sp>
+          <p:nvSpPr>
+            <p:cNvPr id="31" name="Rounded Rectangle 30"/>
+            <p:cNvSpPr/>
+            <p:nvPr/>
+          </p:nvSpPr>
+          <p:spPr>
+            <a:xfrm>
+              <a:off x="8142270" y="148975"/>
+              <a:ext cx="2738063" cy="2465798"/>
+            </a:xfrm>
+            <a:prstGeom prst="roundRect">
+              <a:avLst>
+                <a:gd name="adj" fmla="val 3892"/>
+              </a:avLst>
+            </a:prstGeom>
+            <a:noFill/>
+            <a:ln w="19050">
+              <a:solidFill>
+                <a:schemeClr val="accent2"/>
+              </a:solidFill>
+              <a:prstDash val="dash"/>
+            </a:ln>
+          </p:spPr>
+          <p:style>
+            <a:lnRef idx="2">
+              <a:schemeClr val="accent1">
+                <a:shade val="50000"/>
+              </a:schemeClr>
+            </a:lnRef>
+            <a:fillRef idx="1">
+              <a:schemeClr val="accent1"/>
+            </a:fillRef>
+            <a:effectRef idx="0">
+              <a:schemeClr val="accent1"/>
+            </a:effectRef>
+            <a:fontRef idx="minor">
+              <a:schemeClr val="lt1"/>
+            </a:fontRef>
+          </p:style>
+          <p:txBody>
+            <a:bodyPr rtlCol="0" anchor="ctr"/>
+            <a:lstStyle/>
+            <a:p>
+              <a:pPr algn="ctr"/>
+              <a:endParaRPr lang="en-GB"/>
+            </a:p>
+          </p:txBody>
+        </p:sp>
+        <p:sp>
+          <p:nvSpPr>
+            <p:cNvPr id="32" name="TextBox 31"/>
+            <p:cNvSpPr txBox="1"/>
+            <p:nvPr/>
+          </p:nvSpPr>
+          <p:spPr>
+            <a:xfrm>
+              <a:off x="8142270" y="-172394"/>
+              <a:ext cx="2738063" cy="307777"/>
+            </a:xfrm>
+            <a:prstGeom prst="rect">
+              <a:avLst/>
+            </a:prstGeom>
+            <a:noFill/>
+          </p:spPr>
+          <p:txBody>
+            <a:bodyPr wrap="square" rtlCol="0">
+              <a:spAutoFit/>
+            </a:bodyPr>
+            <a:lstStyle/>
+            <a:p>
+              <a:pPr algn="ctr"/>
+              <a:r>
+                <a:rPr lang="en-GB" sz="1400" dirty="0" smtClean="0">
+                  <a:solidFill>
+                    <a:schemeClr val="accent2"/>
+                  </a:solidFill>
+                </a:rPr>
+                <a:t>Created during processing</a:t>
+              </a:r>
+              <a:endParaRPr lang="en-GB" sz="1400" dirty="0">
+                <a:solidFill>
+                  <a:schemeClr val="accent2"/>
+                </a:solidFill>
+              </a:endParaRPr>
+            </a:p>
+          </p:txBody>
+        </p:sp>
+        <p:sp>
+          <p:nvSpPr>
+            <p:cNvPr id="76" name="Rounded Rectangle 75"/>
+            <p:cNvSpPr/>
+            <p:nvPr/>
+          </p:nvSpPr>
+          <p:spPr>
+            <a:xfrm>
+              <a:off x="5648031" y="10917891"/>
+              <a:ext cx="2373745" cy="258618"/>
+            </a:xfrm>
+            <a:prstGeom prst="roundRect">
+              <a:avLst/>
+            </a:prstGeom>
+            <a:solidFill>
+              <a:schemeClr val="accent6">
+                <a:lumMod val="20000"/>
+                <a:lumOff val="80000"/>
+              </a:schemeClr>
+            </a:solidFill>
+            <a:ln w="19050">
+              <a:solidFill>
+                <a:schemeClr val="accent6"/>
+              </a:solidFill>
+            </a:ln>
+          </p:spPr>
+          <p:style>
+            <a:lnRef idx="2">
+              <a:schemeClr val="accent1">
+                <a:shade val="50000"/>
+              </a:schemeClr>
+            </a:lnRef>
+            <a:fillRef idx="1">
+              <a:schemeClr val="accent1"/>
+            </a:fillRef>
+            <a:effectRef idx="0">
+              <a:schemeClr val="accent1"/>
+            </a:effectRef>
+            <a:fontRef idx="minor">
+              <a:schemeClr val="lt1"/>
+            </a:fontRef>
+          </p:style>
+          <p:txBody>
+            <a:bodyPr rtlCol="0" anchor="ctr"/>
+            <a:lstStyle/>
+            <a:p>
+              <a:pPr algn="ctr"/>
+              <a:r>
+                <a:rPr lang="en-GB" sz="1400" dirty="0" err="1" smtClean="0">
+                  <a:solidFill>
+                    <a:schemeClr val="tx1"/>
+                  </a:solidFill>
+                </a:rPr>
+                <a:t>Your_input_file.fastq</a:t>
+              </a:r>
+              <a:endParaRPr lang="en-GB" sz="1400" dirty="0">
+                <a:solidFill>
+                  <a:schemeClr val="tx1"/>
+                </a:solidFill>
+              </a:endParaRPr>
+            </a:p>
+          </p:txBody>
+        </p:sp>
+        <p:cxnSp>
+          <p:nvCxnSpPr>
+            <p:cNvPr id="78" name="Straight Arrow Connector 77"/>
+            <p:cNvCxnSpPr>
+              <a:stCxn id="7" idx="3"/>
+              <a:endCxn id="76" idx="1"/>
+            </p:cNvCxnSpPr>
+            <p:nvPr/>
+          </p:nvCxnSpPr>
+          <p:spPr>
+            <a:xfrm>
+              <a:off x="5237013" y="11047200"/>
+              <a:ext cx="411018" cy="0"/>
+            </a:xfrm>
+            <a:prstGeom prst="straightConnector1">
+              <a:avLst/>
+            </a:prstGeom>
+            <a:ln>
+              <a:solidFill>
+                <a:schemeClr val="accent6"/>
               </a:solidFill>
               <a:tailEnd type="triangle"/>
             </a:ln>

</xml_diff>